<commit_message>
Teknik tillagt och länk till video
</commit_message>
<xml_diff>
--- a/docs/final_presentation/Powerpoint.pptx
+++ b/docs/final_presentation/Powerpoint.pptx
@@ -12,9 +12,10 @@
     <p:sldId id="260" r:id="rId6"/>
     <p:sldId id="261" r:id="rId7"/>
     <p:sldId id="263" r:id="rId8"/>
-    <p:sldId id="264" r:id="rId9"/>
-    <p:sldId id="265" r:id="rId10"/>
-    <p:sldId id="266" r:id="rId11"/>
+    <p:sldId id="267" r:id="rId9"/>
+    <p:sldId id="264" r:id="rId10"/>
+    <p:sldId id="265" r:id="rId11"/>
+    <p:sldId id="266" r:id="rId12"/>
   </p:sldIdLst>
   <p:sldSz cx="9144000" cy="6858000" type="screen4x3"/>
   <p:notesSz cx="6858000" cy="9144000"/>
@@ -113,6 +114,11 @@
       </a:defRPr>
     </a:lvl9pPr>
   </p:defaultTextStyle>
+  <p:extLst>
+    <p:ext uri="{EFAFB233-063F-42B5-8137-9DF3F51BA10A}">
+      <p15:sldGuideLst xmlns:p15="http://schemas.microsoft.com/office/powerpoint/2012/main"/>
+    </p:ext>
+  </p:extLst>
 </p:presentation>
 </file>
 
@@ -309,7 +315,7 @@
             <a:fld id="{5586B75A-687E-405C-8A0B-8D00578BA2C3}" type="datetimeFigureOut">
               <a:rPr lang="en-US" smtClean="0"/>
               <a:pPr/>
-              <a:t>3/15/2016</a:t>
+              <a:t>3/16/2016</a:t>
             </a:fld>
             <a:endParaRPr lang="en-US" dirty="0"/>
           </a:p>
@@ -500,7 +506,7 @@
           <a:p>
             <a:fld id="{5F4E5243-F52A-4D37-9694-EB26C6C31910}" type="datetimeFigureOut">
               <a:rPr lang="en-US" smtClean="0"/>
-              <a:t>3/15/2016</a:t>
+              <a:t>3/16/2016</a:t>
             </a:fld>
             <a:endParaRPr lang="en-US" dirty="0"/>
           </a:p>
@@ -680,7 +686,7 @@
           <a:p>
             <a:fld id="{3A77B6E1-634A-48DC-9E8B-D894023267EF}" type="datetimeFigureOut">
               <a:rPr lang="en-US" smtClean="0"/>
-              <a:t>3/15/2016</a:t>
+              <a:t>3/16/2016</a:t>
             </a:fld>
             <a:endParaRPr lang="en-US" dirty="0"/>
           </a:p>
@@ -850,7 +856,7 @@
           <a:p>
             <a:fld id="{7B2D3E9E-A95C-48F2-B4BF-A71542E0BE9A}" type="datetimeFigureOut">
               <a:rPr lang="en-US" smtClean="0"/>
-              <a:t>3/15/2016</a:t>
+              <a:t>3/16/2016</a:t>
             </a:fld>
             <a:endParaRPr lang="en-US" dirty="0"/>
           </a:p>
@@ -1107,7 +1113,7 @@
             <a:fld id="{5586B75A-687E-405C-8A0B-8D00578BA2C3}" type="datetimeFigureOut">
               <a:rPr lang="en-US" smtClean="0"/>
               <a:pPr/>
-              <a:t>3/15/2016</a:t>
+              <a:t>3/16/2016</a:t>
             </a:fld>
             <a:endParaRPr lang="en-US" dirty="0"/>
           </a:p>
@@ -1396,7 +1402,7 @@
           <a:p>
             <a:fld id="{F12952B5-7A2F-4CC8-B7CE-9234E21C2837}" type="datetimeFigureOut">
               <a:rPr lang="en-US" smtClean="0"/>
-              <a:t>3/15/2016</a:t>
+              <a:t>3/16/2016</a:t>
             </a:fld>
             <a:endParaRPr lang="en-US" dirty="0"/>
           </a:p>
@@ -1834,7 +1840,7 @@
           <a:p>
             <a:fld id="{CE1DA07A-9201-4B4B-BAF2-015AFA30F520}" type="datetimeFigureOut">
               <a:rPr lang="en-US" smtClean="0"/>
-              <a:t>3/15/2016</a:t>
+              <a:t>3/16/2016</a:t>
             </a:fld>
             <a:endParaRPr lang="en-US" dirty="0"/>
           </a:p>
@@ -1952,7 +1958,7 @@
           <a:p>
             <a:fld id="{73D7E00A-486F-4252-8B1D-E32645521F49}" type="datetimeFigureOut">
               <a:rPr lang="en-US" smtClean="0"/>
-              <a:t>3/15/2016</a:t>
+              <a:t>3/16/2016</a:t>
             </a:fld>
             <a:endParaRPr lang="en-US" dirty="0"/>
           </a:p>
@@ -2047,7 +2053,7 @@
           <a:p>
             <a:fld id="{8DDF5F92-E675-4B36-9A60-69A962A68675}" type="datetimeFigureOut">
               <a:rPr lang="en-US" smtClean="0"/>
-              <a:t>3/15/2016</a:t>
+              <a:t>3/16/2016</a:t>
             </a:fld>
             <a:endParaRPr lang="en-US" dirty="0"/>
           </a:p>
@@ -2403,7 +2409,7 @@
           <a:p>
             <a:fld id="{AF6E2C9B-5FA2-460D-9BE7-B0812FC2A6FF}" type="datetimeFigureOut">
               <a:rPr lang="en-US" smtClean="0"/>
-              <a:t>3/15/2016</a:t>
+              <a:t>3/16/2016</a:t>
             </a:fld>
             <a:endParaRPr lang="en-US" dirty="0"/>
           </a:p>
@@ -2713,7 +2719,7 @@
             <a:fld id="{5586B75A-687E-405C-8A0B-8D00578BA2C3}" type="datetimeFigureOut">
               <a:rPr lang="en-US" smtClean="0"/>
               <a:pPr/>
-              <a:t>3/15/2016</a:t>
+              <a:t>3/16/2016</a:t>
             </a:fld>
             <a:endParaRPr lang="en-US" dirty="0"/>
           </a:p>
@@ -2948,7 +2954,7 @@
             <a:fld id="{5586B75A-687E-405C-8A0B-8D00578BA2C3}" type="datetimeFigureOut">
               <a:rPr lang="en-US" smtClean="0"/>
               <a:pPr/>
-              <a:t>3/15/2016</a:t>
+              <a:t>3/16/2016</a:t>
             </a:fld>
             <a:endParaRPr lang="en-US" dirty="0"/>
           </a:p>
@@ -3474,13 +3480,109 @@
                   <a:schemeClr val="bg1"/>
                 </a:solidFill>
               </a:rPr>
-              <a:t>Applikationen</a:t>
+              <a:t>Nya kunskaper</a:t>
             </a:r>
             <a:endParaRPr lang="en-US" dirty="0">
               <a:solidFill>
                 <a:schemeClr val="bg1"/>
               </a:solidFill>
             </a:endParaRPr>
+          </a:p>
+        </p:txBody>
+      </p:sp>
+      <p:sp>
+        <p:nvSpPr>
+          <p:cNvPr id="3" name="Platshållare för innehåll 2"/>
+          <p:cNvSpPr>
+            <a:spLocks noGrp="1"/>
+          </p:cNvSpPr>
+          <p:nvPr>
+            <p:ph idx="1"/>
+          </p:nvPr>
+        </p:nvSpPr>
+        <p:spPr>
+          <a:xfrm>
+            <a:off x="492920" y="2030341"/>
+            <a:ext cx="7975578" cy="2793586"/>
+          </a:xfrm>
+        </p:spPr>
+        <p:txBody>
+          <a:bodyPr numCol="1">
+            <a:normAutofit/>
+          </a:bodyPr>
+          <a:lstStyle/>
+          <a:p>
+            <a:r>
+              <a:rPr lang="sv-SE" sz="1800" dirty="0">
+                <a:solidFill>
+                  <a:schemeClr val="bg1"/>
+                </a:solidFill>
+              </a:rPr>
+              <a:t>Erfarenhet av grupparbete</a:t>
+            </a:r>
+          </a:p>
+          <a:p>
+            <a:r>
+              <a:rPr lang="sv-SE" sz="1800" dirty="0">
+                <a:solidFill>
+                  <a:schemeClr val="bg1"/>
+                </a:solidFill>
+              </a:rPr>
+              <a:t>Arbete mot skarp kund</a:t>
+            </a:r>
+          </a:p>
+          <a:p>
+            <a:r>
+              <a:rPr lang="sv-SE" sz="1800" dirty="0">
+                <a:solidFill>
+                  <a:schemeClr val="bg1"/>
+                </a:solidFill>
+              </a:rPr>
+              <a:t>Mer avancerad versionshantering</a:t>
+            </a:r>
+          </a:p>
+          <a:p>
+            <a:r>
+              <a:rPr lang="sv-SE" sz="1800" dirty="0">
+                <a:solidFill>
+                  <a:schemeClr val="bg1"/>
+                </a:solidFill>
+              </a:rPr>
+              <a:t>Nytt ramverk och alla småproblem som uppstår med detta.</a:t>
+            </a:r>
+          </a:p>
+          <a:p>
+            <a:r>
+              <a:rPr lang="sv-SE" sz="1800" dirty="0">
+                <a:solidFill>
+                  <a:schemeClr val="bg1"/>
+                </a:solidFill>
+              </a:rPr>
+              <a:t>Testning (både manuella och automatiska)</a:t>
+            </a:r>
+          </a:p>
+          <a:p>
+            <a:r>
+              <a:rPr lang="sv-SE" sz="1800" dirty="0">
+                <a:solidFill>
+                  <a:schemeClr val="bg1"/>
+                </a:solidFill>
+              </a:rPr>
+              <a:t>Bedöma vilken dokumentation vi har nytta av</a:t>
+            </a:r>
+          </a:p>
+          <a:p>
+            <a:pPr marL="4572" lvl="1" indent="0">
+              <a:buNone/>
+            </a:pPr>
+            <a:endParaRPr lang="sv-SE" sz="1800" dirty="0">
+              <a:solidFill>
+                <a:schemeClr val="bg1"/>
+              </a:solidFill>
+            </a:endParaRPr>
+          </a:p>
+          <a:p>
+            <a:endParaRPr lang="en-US" dirty="0"/>
           </a:p>
         </p:txBody>
       </p:sp>
@@ -3514,6 +3616,179 @@
           </a:prstGeom>
         </p:spPr>
       </p:pic>
+    </p:spTree>
+    <p:extLst>
+      <p:ext uri="{BB962C8B-B14F-4D97-AF65-F5344CB8AC3E}">
+        <p14:creationId xmlns:p14="http://schemas.microsoft.com/office/powerpoint/2010/main" val="2640005863"/>
+      </p:ext>
+    </p:extLst>
+  </p:cSld>
+  <p:clrMapOvr>
+    <a:masterClrMapping/>
+  </p:clrMapOvr>
+  <p:timing>
+    <p:tnLst>
+      <p:par>
+        <p:cTn id="1" dur="indefinite" restart="never" nodeType="tmRoot"/>
+      </p:par>
+    </p:tnLst>
+  </p:timing>
+</p:sld>
+</file>
+
+<file path=ppt/slides/slide11.xml><?xml version="1.0" encoding="utf-8"?>
+<p:sld xmlns:a="http://schemas.openxmlformats.org/drawingml/2006/main" xmlns:r="http://schemas.openxmlformats.org/officeDocument/2006/relationships" xmlns:p="http://schemas.openxmlformats.org/presentationml/2006/main">
+  <p:cSld>
+    <p:spTree>
+      <p:nvGrpSpPr>
+        <p:cNvPr id="1" name=""/>
+        <p:cNvGrpSpPr/>
+        <p:nvPr/>
+      </p:nvGrpSpPr>
+      <p:grpSpPr>
+        <a:xfrm>
+          <a:off x="0" y="0"/>
+          <a:ext cx="0" cy="0"/>
+          <a:chOff x="0" y="0"/>
+          <a:chExt cx="0" cy="0"/>
+        </a:xfrm>
+      </p:grpSpPr>
+      <p:sp>
+        <p:nvSpPr>
+          <p:cNvPr id="2" name="Rubrik 1"/>
+          <p:cNvSpPr>
+            <a:spLocks noGrp="1"/>
+          </p:cNvSpPr>
+          <p:nvPr>
+            <p:ph type="title"/>
+          </p:nvPr>
+        </p:nvSpPr>
+        <p:spPr/>
+        <p:txBody>
+          <a:bodyPr/>
+          <a:lstStyle/>
+          <a:p>
+            <a:r>
+              <a:rPr lang="sv-SE" dirty="0" smtClean="0">
+                <a:solidFill>
+                  <a:schemeClr val="bg1"/>
+                </a:solidFill>
+              </a:rPr>
+              <a:t>Applikationen</a:t>
+            </a:r>
+            <a:endParaRPr lang="en-US" dirty="0">
+              <a:solidFill>
+                <a:schemeClr val="bg1"/>
+              </a:solidFill>
+            </a:endParaRPr>
+          </a:p>
+        </p:txBody>
+      </p:sp>
+      <p:pic>
+        <p:nvPicPr>
+          <p:cNvPr id="4" name="Bildobjekt 3"/>
+          <p:cNvPicPr>
+            <a:picLocks noChangeAspect="1"/>
+          </p:cNvPicPr>
+          <p:nvPr/>
+        </p:nvPicPr>
+        <p:blipFill>
+          <a:blip r:embed="rId2">
+            <a:extLst>
+              <a:ext uri="{28A0092B-C50C-407E-A947-70E740481C1C}">
+                <a14:useLocalDpi xmlns:a14="http://schemas.microsoft.com/office/drawing/2010/main" val="0"/>
+              </a:ext>
+            </a:extLst>
+          </a:blip>
+          <a:stretch>
+            <a:fillRect/>
+          </a:stretch>
+        </p:blipFill>
+        <p:spPr>
+          <a:xfrm>
+            <a:off x="7334250" y="0"/>
+            <a:ext cx="1809750" cy="952500"/>
+          </a:xfrm>
+          <a:prstGeom prst="rect">
+            <a:avLst/>
+          </a:prstGeom>
+        </p:spPr>
+      </p:pic>
+      <p:pic>
+        <p:nvPicPr>
+          <p:cNvPr id="3" name="Bildobjekt 2">
+            <a:hlinkClick r:id="rId3"/>
+          </p:cNvPr>
+          <p:cNvPicPr>
+            <a:picLocks noChangeAspect="1"/>
+          </p:cNvPicPr>
+          <p:nvPr/>
+        </p:nvPicPr>
+        <p:blipFill>
+          <a:blip r:embed="rId4"/>
+          <a:stretch>
+            <a:fillRect/>
+          </a:stretch>
+        </p:blipFill>
+        <p:spPr>
+          <a:xfrm>
+            <a:off x="1741176" y="1885883"/>
+            <a:ext cx="5583066" cy="4168457"/>
+          </a:xfrm>
+          <a:prstGeom prst="rect">
+            <a:avLst/>
+          </a:prstGeom>
+          <a:ln w="76200">
+            <a:solidFill>
+              <a:schemeClr val="bg1"/>
+            </a:solidFill>
+          </a:ln>
+        </p:spPr>
+      </p:pic>
+      <p:sp>
+        <p:nvSpPr>
+          <p:cNvPr id="5" name="Platshållare för innehåll 2"/>
+          <p:cNvSpPr>
+            <a:spLocks noGrp="1"/>
+          </p:cNvSpPr>
+          <p:nvPr>
+            <p:ph idx="1"/>
+          </p:nvPr>
+        </p:nvSpPr>
+        <p:spPr>
+          <a:xfrm>
+            <a:off x="2612617" y="6322255"/>
+            <a:ext cx="3840184" cy="391584"/>
+          </a:xfrm>
+        </p:spPr>
+        <p:txBody>
+          <a:bodyPr numCol="1">
+            <a:normAutofit/>
+          </a:bodyPr>
+          <a:lstStyle/>
+          <a:p>
+            <a:pPr marL="4572" lvl="1" indent="0" algn="ctr">
+              <a:buNone/>
+            </a:pPr>
+            <a:r>
+              <a:rPr lang="sv-SE" sz="1800" dirty="0">
+                <a:solidFill>
+                  <a:schemeClr val="bg1"/>
+                </a:solidFill>
+              </a:rPr>
+              <a:t>https://youtu.be/BtHOK6h9xWA</a:t>
+            </a:r>
+            <a:endParaRPr lang="sv-SE" sz="1800" dirty="0">
+              <a:solidFill>
+                <a:schemeClr val="bg1"/>
+              </a:solidFill>
+            </a:endParaRPr>
+          </a:p>
+          <a:p>
+            <a:endParaRPr lang="en-US" dirty="0"/>
+          </a:p>
+        </p:txBody>
+      </p:sp>
     </p:spTree>
     <p:extLst>
       <p:ext uri="{BB962C8B-B14F-4D97-AF65-F5344CB8AC3E}">
@@ -3639,7 +3914,38 @@
                   <a:schemeClr val="bg1"/>
                 </a:solidFill>
               </a:rPr>
-              <a:t>Administratör kan skapa experter och ladda upp ljudbloggar (mp3, m4a)</a:t>
+              <a:t>Administratör kan skapa experter och ladda upp ljudbloggar </a:t>
+            </a:r>
+            <a:r>
+              <a:rPr lang="sv-SE" dirty="0" smtClean="0">
+                <a:solidFill>
+                  <a:schemeClr val="bg1"/>
+                </a:solidFill>
+              </a:rPr>
+              <a:t/>
+            </a:r>
+            <a:br>
+              <a:rPr lang="sv-SE" dirty="0" smtClean="0">
+                <a:solidFill>
+                  <a:schemeClr val="bg1"/>
+                </a:solidFill>
+              </a:rPr>
+            </a:br>
+            <a:r>
+              <a:rPr lang="sv-SE" dirty="0" smtClean="0">
+                <a:solidFill>
+                  <a:schemeClr val="bg1"/>
+                </a:solidFill>
+              </a:rPr>
+              <a:t>(</a:t>
+            </a:r>
+            <a:r>
+              <a:rPr lang="sv-SE" dirty="0" smtClean="0">
+                <a:solidFill>
+                  <a:schemeClr val="bg1"/>
+                </a:solidFill>
+              </a:rPr>
+              <a:t>mp3, m4a)</a:t>
             </a:r>
           </a:p>
           <a:p>
@@ -4182,39 +4488,7 @@
                   <a:schemeClr val="bg1"/>
                 </a:solidFill>
               </a:rPr>
-              <a:t>BK </a:t>
-            </a:r>
-            <a:r>
-              <a:rPr lang="sv-SE" sz="1800" dirty="0">
-                <a:solidFill>
-                  <a:schemeClr val="bg1"/>
-                </a:solidFill>
-              </a:rPr>
-              <a:t>1:    </a:t>
-            </a:r>
-            <a:r>
-              <a:rPr lang="sv-SE" sz="1800" dirty="0">
-                <a:solidFill>
-                  <a:schemeClr val="bg1"/>
-                </a:solidFill>
-              </a:rPr>
-              <a:t>	Användarnas </a:t>
-            </a:r>
-            <a:r>
-              <a:rPr lang="sv-SE" sz="1800" dirty="0">
-                <a:solidFill>
-                  <a:schemeClr val="bg1"/>
-                </a:solidFill>
-              </a:rPr>
-              <a:t>intryck av applikationen ska vara designmässigt modernt</a:t>
-            </a:r>
-            <a:r>
-              <a:rPr lang="sv-SE" sz="1800" dirty="0">
-                <a:solidFill>
-                  <a:schemeClr val="bg1"/>
-                </a:solidFill>
-              </a:rPr>
-              <a:t>.</a:t>
+              <a:t>BK 1:    	Användarnas intryck av applikationen ska vara designmässigt modernt.</a:t>
             </a:r>
           </a:p>
           <a:p>
@@ -4239,39 +4513,7 @@
                   <a:schemeClr val="bg1"/>
                 </a:solidFill>
               </a:rPr>
-              <a:t>    </a:t>
-            </a:r>
-            <a:r>
-              <a:rPr lang="sv-SE" sz="1800" dirty="0">
-                <a:solidFill>
-                  <a:schemeClr val="bg1"/>
-                </a:solidFill>
-              </a:rPr>
-              <a:t>	BK </a:t>
-            </a:r>
-            <a:r>
-              <a:rPr lang="sv-SE" sz="1800" dirty="0">
-                <a:solidFill>
-                  <a:schemeClr val="bg1"/>
-                </a:solidFill>
-              </a:rPr>
-              <a:t>1.1: </a:t>
-            </a:r>
-            <a:r>
-              <a:rPr lang="sv-SE" sz="1800" dirty="0">
-                <a:solidFill>
-                  <a:schemeClr val="bg1"/>
-                </a:solidFill>
-              </a:rPr>
-              <a:t>Applikationens </a:t>
-            </a:r>
-            <a:r>
-              <a:rPr lang="sv-SE" sz="1800" dirty="0">
-                <a:solidFill>
-                  <a:schemeClr val="bg1"/>
-                </a:solidFill>
-              </a:rPr>
-              <a:t>design ska fungera väl i  mobil, surfplatta och </a:t>
+              <a:t>    	BK 1.1: Applikationens design ska fungera väl i  mobil, surfplatta och </a:t>
             </a:r>
             <a:r>
               <a:rPr lang="sv-SE" sz="1800" dirty="0" smtClean="0">
@@ -4304,45 +4546,8 @@
                   <a:schemeClr val="bg1"/>
                 </a:solidFill>
               </a:rPr>
-              <a:t>BK 2: </a:t>
-            </a:r>
-            <a:r>
-              <a:rPr lang="sv-SE" sz="1700" dirty="0">
-                <a:solidFill>
-                  <a:schemeClr val="bg1"/>
-                </a:solidFill>
-              </a:rPr>
-              <a:t>	Användarna </a:t>
-            </a:r>
-            <a:r>
-              <a:rPr lang="sv-SE" sz="1700" dirty="0">
-                <a:solidFill>
-                  <a:schemeClr val="bg1"/>
-                </a:solidFill>
-              </a:rPr>
-              <a:t>ska kunna lyssna på podcasts från en rad </a:t>
-            </a:r>
-            <a:r>
-              <a:rPr lang="sv-SE" sz="1700" dirty="0">
-                <a:solidFill>
-                  <a:schemeClr val="bg1"/>
-                </a:solidFill>
-              </a:rPr>
-              <a:t>berömda säljexperter</a:t>
-            </a:r>
-            <a:r>
-              <a:rPr lang="sv-SE" sz="1700" dirty="0">
-                <a:solidFill>
-                  <a:schemeClr val="bg1"/>
-                </a:solidFill>
-              </a:rPr>
-              <a:t>.</a:t>
-            </a:r>
-            <a:endParaRPr lang="sv-SE" sz="1700" dirty="0">
-              <a:solidFill>
-                <a:schemeClr val="bg1"/>
-              </a:solidFill>
-            </a:endParaRPr>
+              <a:t>BK 2: 	Användarna ska kunna lyssna på podcasts från en rad berömda säljexperter.</a:t>
+            </a:r>
           </a:p>
           <a:p>
             <a:pPr lvl="3"/>
@@ -4360,7 +4565,15 @@
                   <a:schemeClr val="bg1"/>
                 </a:solidFill>
               </a:rPr>
-              <a:t>  BK </a:t>
+              <a:t>  BK 2.1: Användarna ska på ett enkelt sätt kunna skapa ett konto för att </a:t>
+            </a:r>
+            <a:r>
+              <a:rPr lang="sv-SE" sz="1700" dirty="0" smtClean="0">
+                <a:solidFill>
+                  <a:schemeClr val="bg1"/>
+                </a:solidFill>
+              </a:rPr>
+              <a:t>	           	             kunna </a:t>
             </a:r>
             <a:r>
               <a:rPr lang="sv-SE" sz="1700" dirty="0">
@@ -4368,29 +4581,8 @@
                   <a:schemeClr val="bg1"/>
                 </a:solidFill>
               </a:rPr>
-              <a:t>2.1: Användarna ska på ett enkelt sätt kunna skapa ett konto för att </a:t>
-            </a:r>
-            <a:r>
-              <a:rPr lang="sv-SE" sz="1700" dirty="0" smtClean="0">
-                <a:solidFill>
-                  <a:schemeClr val="bg1"/>
-                </a:solidFill>
-              </a:rPr>
-              <a:t>	           	             kunna </a:t>
-            </a:r>
-            <a:r>
-              <a:rPr lang="sv-SE" sz="1700" dirty="0">
-                <a:solidFill>
-                  <a:schemeClr val="bg1"/>
-                </a:solidFill>
-              </a:rPr>
               <a:t>logga in på tjänsten.</a:t>
             </a:r>
-            <a:endParaRPr lang="sv-SE" sz="1700" dirty="0">
-              <a:solidFill>
-                <a:schemeClr val="bg1"/>
-              </a:solidFill>
-            </a:endParaRPr>
           </a:p>
           <a:p>
             <a:r>
@@ -4414,31 +4606,7 @@
                   <a:schemeClr val="bg1"/>
                 </a:solidFill>
               </a:rPr>
-              <a:t>BK 3:     </a:t>
-            </a:r>
-            <a:r>
-              <a:rPr lang="sv-SE" sz="1800" dirty="0">
-                <a:solidFill>
-                  <a:schemeClr val="bg1"/>
-                </a:solidFill>
-              </a:rPr>
-              <a:t>	Administratören </a:t>
-            </a:r>
-            <a:r>
-              <a:rPr lang="sv-SE" sz="1800" dirty="0">
-                <a:solidFill>
-                  <a:schemeClr val="bg1"/>
-                </a:solidFill>
-              </a:rPr>
-              <a:t>av applikationen ska, via en </a:t>
-            </a:r>
-            <a:r>
-              <a:rPr lang="sv-SE" sz="1800" dirty="0">
-                <a:solidFill>
-                  <a:schemeClr val="bg1"/>
-                </a:solidFill>
-              </a:rPr>
-              <a:t>användarvänlig </a:t>
+              <a:t>BK 3:     	Administratören av applikationen ska, via en användarvänlig </a:t>
             </a:r>
             <a:r>
               <a:rPr lang="sv-SE" sz="1800" dirty="0" smtClean="0">
@@ -4503,11 +4671,6 @@
               </a:rPr>
               <a:t>och användare.</a:t>
             </a:r>
-            <a:endParaRPr lang="sv-SE" sz="1800" dirty="0">
-              <a:solidFill>
-                <a:schemeClr val="bg1"/>
-              </a:solidFill>
-            </a:endParaRPr>
           </a:p>
           <a:p>
             <a:endParaRPr lang="en-US" dirty="0"/>
@@ -4982,7 +5145,7 @@
                   <a:schemeClr val="bg1"/>
                 </a:solidFill>
               </a:rPr>
-              <a:t>Problematik</a:t>
+              <a:t>Teknik</a:t>
             </a:r>
             <a:endParaRPr lang="en-US" dirty="0">
               <a:solidFill>
@@ -5004,8 +5167,8 @@
         </p:nvSpPr>
         <p:spPr>
           <a:xfrm>
-            <a:off x="492919" y="2006936"/>
-            <a:ext cx="4521809" cy="871479"/>
+            <a:off x="492920" y="2157730"/>
+            <a:ext cx="8240020" cy="3839415"/>
           </a:xfrm>
         </p:spPr>
         <p:txBody>
@@ -5015,14 +5178,157 @@
           <a:lstStyle/>
           <a:p>
             <a:r>
-              <a:rPr lang="sv-SE" sz="1800" dirty="0" err="1">
-                <a:solidFill>
-                  <a:schemeClr val="bg1"/>
-                </a:solidFill>
-              </a:rPr>
-              <a:t>Adminpanelen</a:t>
-            </a:r>
-            <a:endParaRPr lang="sv-SE" sz="1800" dirty="0">
+              <a:rPr lang="sv-SE" sz="1800" b="1" dirty="0" smtClean="0">
+                <a:solidFill>
+                  <a:schemeClr val="bg1"/>
+                </a:solidFill>
+              </a:rPr>
+              <a:t>PHP</a:t>
+            </a:r>
+            <a:r>
+              <a:rPr lang="sv-SE" sz="1800" dirty="0" smtClean="0">
+                <a:solidFill>
+                  <a:schemeClr val="bg1"/>
+                </a:solidFill>
+              </a:rPr>
+              <a:t/>
+            </a:r>
+            <a:br>
+              <a:rPr lang="sv-SE" sz="1800" dirty="0" smtClean="0">
+                <a:solidFill>
+                  <a:schemeClr val="bg1"/>
+                </a:solidFill>
+              </a:rPr>
+            </a:br>
+            <a:r>
+              <a:rPr lang="sv-SE" sz="1800" dirty="0" smtClean="0">
+                <a:solidFill>
+                  <a:schemeClr val="bg1"/>
+                </a:solidFill>
+              </a:rPr>
+              <a:t>    </a:t>
+            </a:r>
+            <a:r>
+              <a:rPr lang="sv-SE" sz="1800" dirty="0" err="1" smtClean="0">
+                <a:solidFill>
+                  <a:schemeClr val="bg1"/>
+                </a:solidFill>
+              </a:rPr>
+              <a:t>Laravel</a:t>
+            </a:r>
+            <a:r>
+              <a:rPr lang="sv-SE" sz="1800" dirty="0" smtClean="0">
+                <a:solidFill>
+                  <a:schemeClr val="bg1"/>
+                </a:solidFill>
+              </a:rPr>
+              <a:t> (MVC ramverk)</a:t>
+            </a:r>
+            <a:br>
+              <a:rPr lang="sv-SE" sz="1800" dirty="0" smtClean="0">
+                <a:solidFill>
+                  <a:schemeClr val="bg1"/>
+                </a:solidFill>
+              </a:rPr>
+            </a:br>
+            <a:r>
+              <a:rPr lang="sv-SE" sz="1800" dirty="0" smtClean="0">
+                <a:solidFill>
+                  <a:schemeClr val="bg1"/>
+                </a:solidFill>
+              </a:rPr>
+              <a:t>         </a:t>
+            </a:r>
+            <a:r>
+              <a:rPr lang="sv-SE" sz="1800" dirty="0" err="1" smtClean="0">
+                <a:solidFill>
+                  <a:schemeClr val="bg1"/>
+                </a:solidFill>
+              </a:rPr>
+              <a:t>LaravelPanel</a:t>
+            </a:r>
+            <a:r>
+              <a:rPr lang="sv-SE" sz="1800" dirty="0" smtClean="0">
+                <a:solidFill>
+                  <a:schemeClr val="bg1"/>
+                </a:solidFill>
+              </a:rPr>
+              <a:t> (</a:t>
+            </a:r>
+            <a:r>
+              <a:rPr lang="sv-SE" sz="1800" dirty="0" err="1" smtClean="0">
+                <a:solidFill>
+                  <a:schemeClr val="bg1"/>
+                </a:solidFill>
+              </a:rPr>
+              <a:t>adminpanel</a:t>
+            </a:r>
+            <a:r>
+              <a:rPr lang="sv-SE" sz="1800" dirty="0" smtClean="0">
+                <a:solidFill>
+                  <a:schemeClr val="bg1"/>
+                </a:solidFill>
+              </a:rPr>
+              <a:t>)</a:t>
+            </a:r>
+            <a:br>
+              <a:rPr lang="sv-SE" sz="1800" dirty="0" smtClean="0">
+                <a:solidFill>
+                  <a:schemeClr val="bg1"/>
+                </a:solidFill>
+              </a:rPr>
+            </a:br>
+            <a:r>
+              <a:rPr lang="sv-SE" sz="1800" dirty="0" smtClean="0">
+                <a:solidFill>
+                  <a:schemeClr val="bg1"/>
+                </a:solidFill>
+              </a:rPr>
+              <a:t>         </a:t>
+            </a:r>
+            <a:r>
+              <a:rPr lang="sv-SE" sz="1800" dirty="0" err="1" smtClean="0">
+                <a:solidFill>
+                  <a:schemeClr val="bg1"/>
+                </a:solidFill>
+              </a:rPr>
+              <a:t>Integrated</a:t>
+            </a:r>
+            <a:r>
+              <a:rPr lang="sv-SE" sz="1800" dirty="0" smtClean="0">
+                <a:solidFill>
+                  <a:schemeClr val="bg1"/>
+                </a:solidFill>
+              </a:rPr>
+              <a:t> (enhetstestning byggt på </a:t>
+            </a:r>
+            <a:r>
+              <a:rPr lang="sv-SE" sz="1800" dirty="0" err="1" smtClean="0">
+                <a:solidFill>
+                  <a:schemeClr val="bg1"/>
+                </a:solidFill>
+              </a:rPr>
+              <a:t>PHPUnit</a:t>
+            </a:r>
+            <a:r>
+              <a:rPr lang="sv-SE" sz="1800" dirty="0" smtClean="0">
+                <a:solidFill>
+                  <a:schemeClr val="bg1"/>
+                </a:solidFill>
+              </a:rPr>
+              <a:t>)</a:t>
+            </a:r>
+          </a:p>
+          <a:p>
+            <a:r>
+              <a:rPr lang="sv-SE" sz="1800" b="1" dirty="0" err="1" smtClean="0">
+                <a:solidFill>
+                  <a:schemeClr val="bg1"/>
+                </a:solidFill>
+              </a:rPr>
+              <a:t>MySQL</a:t>
+            </a:r>
+            <a:endParaRPr lang="sv-SE" sz="1800" b="1" dirty="0" smtClean="0">
               <a:solidFill>
                 <a:schemeClr val="bg1"/>
               </a:solidFill>
@@ -5030,13 +5336,73 @@
           </a:p>
           <a:p>
             <a:r>
-              <a:rPr lang="sv-SE" sz="1800" dirty="0" err="1">
+              <a:rPr lang="sv-SE" sz="1800" b="1" dirty="0" err="1" smtClean="0">
+                <a:solidFill>
+                  <a:schemeClr val="bg1"/>
+                </a:solidFill>
+              </a:rPr>
+              <a:t>jQuery</a:t>
+            </a:r>
+            <a:endParaRPr lang="sv-SE" sz="1800" b="1" dirty="0" smtClean="0">
+              <a:solidFill>
+                <a:schemeClr val="bg1"/>
+              </a:solidFill>
+            </a:endParaRPr>
+          </a:p>
+          <a:p>
+            <a:pPr lvl="1"/>
+            <a:r>
+              <a:rPr lang="sv-SE" sz="1800" dirty="0" smtClean="0">
+                <a:solidFill>
+                  <a:schemeClr val="bg1"/>
+                </a:solidFill>
+              </a:rPr>
+              <a:t>Slick.js (slider)</a:t>
+            </a:r>
+          </a:p>
+          <a:p>
+            <a:pPr marL="4572" lvl="1" indent="0">
+              <a:buNone/>
+            </a:pPr>
+            <a:r>
+              <a:rPr lang="sv-SE" sz="1800" dirty="0" smtClean="0">
+                <a:solidFill>
+                  <a:schemeClr val="bg1"/>
+                </a:solidFill>
+              </a:rPr>
+              <a:t>       </a:t>
+            </a:r>
+            <a:r>
+              <a:rPr lang="sv-SE" sz="1800" strike="sngStrike" dirty="0" err="1" smtClean="0">
                 <a:solidFill>
                   <a:schemeClr val="bg1"/>
                 </a:solidFill>
               </a:rPr>
               <a:t>jPlayer</a:t>
             </a:r>
+            <a:r>
+              <a:rPr lang="sv-SE" sz="1800" strike="sngStrike" dirty="0" smtClean="0">
+                <a:solidFill>
+                  <a:schemeClr val="bg1"/>
+                </a:solidFill>
+              </a:rPr>
+              <a:t> (ljuduppspelning)</a:t>
+            </a:r>
+          </a:p>
+          <a:p>
+            <a:pPr marL="4572" lvl="1" indent="0">
+              <a:buNone/>
+            </a:pPr>
+            <a:r>
+              <a:rPr lang="sv-SE" sz="1800" dirty="0" smtClean="0">
+                <a:solidFill>
+                  <a:schemeClr val="bg1"/>
+                </a:solidFill>
+              </a:rPr>
+              <a:t>       SoundManager2 (ljuduppspelning)</a:t>
+            </a:r>
+          </a:p>
+          <a:p>
             <a:endParaRPr lang="sv-SE" sz="1800" dirty="0">
               <a:solidFill>
                 <a:schemeClr val="bg1"/>
@@ -5088,346 +5454,10 @@
           </a:prstGeom>
         </p:spPr>
       </p:pic>
-      <p:sp>
-        <p:nvSpPr>
-          <p:cNvPr id="5" name="Rubrik 1"/>
-          <p:cNvSpPr txBox="1">
-            <a:spLocks/>
-          </p:cNvSpPr>
-          <p:nvPr/>
-        </p:nvSpPr>
-        <p:spPr>
-          <a:xfrm>
-            <a:off x="492920" y="3076951"/>
-            <a:ext cx="6098342" cy="1658198"/>
-          </a:xfrm>
-          <a:prstGeom prst="rect">
-            <a:avLst/>
-          </a:prstGeom>
-        </p:spPr>
-        <p:txBody>
-          <a:bodyPr vert="horz" lIns="91440" tIns="45720" rIns="91440" bIns="45720" rtlCol="0" anchor="ctr">
-            <a:normAutofit/>
-          </a:bodyPr>
-          <a:lstStyle>
-            <a:lvl1pPr algn="l" defTabSz="914400" rtl="0" eaLnBrk="1" latinLnBrk="0" hangingPunct="1">
-              <a:lnSpc>
-                <a:spcPct val="85000"/>
-              </a:lnSpc>
-              <a:spcBef>
-                <a:spcPct val="0"/>
-              </a:spcBef>
-              <a:buNone/>
-              <a:defRPr sz="5400" kern="1200" spc="-120" baseline="0">
-                <a:solidFill>
-                  <a:schemeClr val="accent1"/>
-                </a:solidFill>
-                <a:latin typeface="+mj-lt"/>
-                <a:ea typeface="+mj-ea"/>
-                <a:cs typeface="+mj-cs"/>
-              </a:defRPr>
-            </a:lvl1pPr>
-          </a:lstStyle>
-          <a:p>
-            <a:r>
-              <a:rPr lang="sv-SE" dirty="0">
-                <a:solidFill>
-                  <a:schemeClr val="bg1"/>
-                </a:solidFill>
-              </a:rPr>
-              <a:t>Lärdomar</a:t>
-            </a:r>
-            <a:endParaRPr lang="en-US" dirty="0">
-              <a:solidFill>
-                <a:schemeClr val="bg1"/>
-              </a:solidFill>
-            </a:endParaRPr>
-          </a:p>
-        </p:txBody>
-      </p:sp>
-      <p:sp>
-        <p:nvSpPr>
-          <p:cNvPr id="6" name="Platshållare för innehåll 2"/>
-          <p:cNvSpPr txBox="1">
-            <a:spLocks/>
-          </p:cNvSpPr>
-          <p:nvPr/>
-        </p:nvSpPr>
-        <p:spPr>
-          <a:xfrm>
-            <a:off x="492919" y="4607760"/>
-            <a:ext cx="6436387" cy="871479"/>
-          </a:xfrm>
-          <a:prstGeom prst="rect">
-            <a:avLst/>
-          </a:prstGeom>
-        </p:spPr>
-        <p:txBody>
-          <a:bodyPr vert="horz" lIns="91440" tIns="45720" rIns="91440" bIns="45720" numCol="1" rtlCol="0">
-            <a:normAutofit fontScale="92500" lnSpcReduction="10000"/>
-          </a:bodyPr>
-          <a:lstStyle>
-            <a:lvl1pPr marL="91440" indent="-91440" algn="l" defTabSz="914400" rtl="0" eaLnBrk="1" latinLnBrk="0" hangingPunct="1">
-              <a:lnSpc>
-                <a:spcPct val="85000"/>
-              </a:lnSpc>
-              <a:spcBef>
-                <a:spcPts val="1300"/>
-              </a:spcBef>
-              <a:buFont typeface="Arial" pitchFamily="34" charset="0"/>
-              <a:buChar char=" "/>
-              <a:defRPr sz="2400" kern="1200">
-                <a:solidFill>
-                  <a:schemeClr val="tx1">
-                    <a:lumMod val="85000"/>
-                    <a:lumOff val="15000"/>
-                  </a:schemeClr>
-                </a:solidFill>
-                <a:latin typeface="+mn-lt"/>
-                <a:ea typeface="+mn-ea"/>
-                <a:cs typeface="+mn-cs"/>
-              </a:defRPr>
-            </a:lvl1pPr>
-            <a:lvl2pPr marL="347472" indent="-342900" algn="l" defTabSz="914400" rtl="0" eaLnBrk="1" latinLnBrk="0" hangingPunct="1">
-              <a:lnSpc>
-                <a:spcPct val="85000"/>
-              </a:lnSpc>
-              <a:spcBef>
-                <a:spcPts val="600"/>
-              </a:spcBef>
-              <a:buFont typeface="Arial" pitchFamily="34" charset="0"/>
-              <a:buChar char=" "/>
-              <a:defRPr sz="2400" kern="1200">
-                <a:solidFill>
-                  <a:schemeClr val="tx1">
-                    <a:lumMod val="85000"/>
-                    <a:lumOff val="15000"/>
-                  </a:schemeClr>
-                </a:solidFill>
-                <a:latin typeface="+mn-lt"/>
-                <a:ea typeface="+mn-ea"/>
-                <a:cs typeface="+mn-cs"/>
-              </a:defRPr>
-            </a:lvl2pPr>
-            <a:lvl3pPr marL="548640" indent="-548640" algn="l" defTabSz="914400" rtl="0" eaLnBrk="1" latinLnBrk="0" hangingPunct="1">
-              <a:lnSpc>
-                <a:spcPct val="85000"/>
-              </a:lnSpc>
-              <a:spcBef>
-                <a:spcPts val="600"/>
-              </a:spcBef>
-              <a:buFont typeface="Arial" pitchFamily="34" charset="0"/>
-              <a:buChar char=" "/>
-              <a:defRPr sz="2000" i="1" kern="1200">
-                <a:solidFill>
-                  <a:schemeClr val="tx1">
-                    <a:lumMod val="85000"/>
-                    <a:lumOff val="15000"/>
-                  </a:schemeClr>
-                </a:solidFill>
-                <a:latin typeface="+mn-lt"/>
-                <a:ea typeface="+mn-ea"/>
-                <a:cs typeface="+mn-cs"/>
-              </a:defRPr>
-            </a:lvl3pPr>
-            <a:lvl4pPr marL="822960" indent="-822960" algn="l" defTabSz="914400" rtl="0" eaLnBrk="1" latinLnBrk="0" hangingPunct="1">
-              <a:lnSpc>
-                <a:spcPct val="85000"/>
-              </a:lnSpc>
-              <a:spcBef>
-                <a:spcPts val="600"/>
-              </a:spcBef>
-              <a:buFont typeface="Arial" pitchFamily="34" charset="0"/>
-              <a:buChar char=" "/>
-              <a:defRPr sz="1800" kern="1200">
-                <a:solidFill>
-                  <a:schemeClr val="tx1">
-                    <a:lumMod val="85000"/>
-                    <a:lumOff val="15000"/>
-                  </a:schemeClr>
-                </a:solidFill>
-                <a:latin typeface="+mn-lt"/>
-                <a:ea typeface="+mn-ea"/>
-                <a:cs typeface="+mn-cs"/>
-              </a:defRPr>
-            </a:lvl4pPr>
-            <a:lvl5pPr marL="1097280" indent="-1097280" algn="l" defTabSz="914400" rtl="0" eaLnBrk="1" latinLnBrk="0" hangingPunct="1">
-              <a:lnSpc>
-                <a:spcPct val="85000"/>
-              </a:lnSpc>
-              <a:spcBef>
-                <a:spcPts val="600"/>
-              </a:spcBef>
-              <a:buFont typeface="Arial" pitchFamily="34" charset="0"/>
-              <a:buChar char=" "/>
-              <a:defRPr sz="1800" kern="1200">
-                <a:solidFill>
-                  <a:schemeClr val="tx1">
-                    <a:lumMod val="85000"/>
-                    <a:lumOff val="15000"/>
-                  </a:schemeClr>
-                </a:solidFill>
-                <a:latin typeface="+mn-lt"/>
-                <a:ea typeface="+mn-ea"/>
-                <a:cs typeface="+mn-cs"/>
-              </a:defRPr>
-            </a:lvl5pPr>
-            <a:lvl6pPr marL="1200000" indent="-228600" algn="l" defTabSz="914400" rtl="0" eaLnBrk="1" latinLnBrk="0" hangingPunct="1">
-              <a:lnSpc>
-                <a:spcPct val="85000"/>
-              </a:lnSpc>
-              <a:spcBef>
-                <a:spcPts val="600"/>
-              </a:spcBef>
-              <a:buFont typeface="Arial" pitchFamily="34" charset="0"/>
-              <a:buChar char=" "/>
-              <a:defRPr sz="1800" kern="1200">
-                <a:solidFill>
-                  <a:schemeClr val="tx1">
-                    <a:lumMod val="85000"/>
-                    <a:lumOff val="15000"/>
-                  </a:schemeClr>
-                </a:solidFill>
-                <a:latin typeface="+mn-lt"/>
-                <a:ea typeface="+mn-ea"/>
-                <a:cs typeface="+mn-cs"/>
-              </a:defRPr>
-            </a:lvl6pPr>
-            <a:lvl7pPr marL="1400000" indent="-228600" algn="l" defTabSz="914400" rtl="0" eaLnBrk="1" latinLnBrk="0" hangingPunct="1">
-              <a:lnSpc>
-                <a:spcPct val="85000"/>
-              </a:lnSpc>
-              <a:spcBef>
-                <a:spcPts val="600"/>
-              </a:spcBef>
-              <a:buFont typeface="Arial" pitchFamily="34" charset="0"/>
-              <a:buChar char=" "/>
-              <a:defRPr sz="1800" kern="1200">
-                <a:solidFill>
-                  <a:schemeClr val="tx1">
-                    <a:lumMod val="85000"/>
-                    <a:lumOff val="15000"/>
-                  </a:schemeClr>
-                </a:solidFill>
-                <a:latin typeface="+mn-lt"/>
-                <a:ea typeface="+mn-ea"/>
-                <a:cs typeface="+mn-cs"/>
-              </a:defRPr>
-            </a:lvl7pPr>
-            <a:lvl8pPr marL="1600000" indent="-228600" algn="l" defTabSz="914400" rtl="0" eaLnBrk="1" latinLnBrk="0" hangingPunct="1">
-              <a:lnSpc>
-                <a:spcPct val="85000"/>
-              </a:lnSpc>
-              <a:spcBef>
-                <a:spcPts val="600"/>
-              </a:spcBef>
-              <a:buFont typeface="Arial" pitchFamily="34" charset="0"/>
-              <a:buChar char=" "/>
-              <a:defRPr sz="1800" kern="1200">
-                <a:solidFill>
-                  <a:schemeClr val="tx1">
-                    <a:lumMod val="85000"/>
-                    <a:lumOff val="15000"/>
-                  </a:schemeClr>
-                </a:solidFill>
-                <a:latin typeface="+mn-lt"/>
-                <a:ea typeface="+mn-ea"/>
-                <a:cs typeface="+mn-cs"/>
-              </a:defRPr>
-            </a:lvl8pPr>
-            <a:lvl9pPr marL="1800000" indent="-228600" algn="l" defTabSz="914400" rtl="0" eaLnBrk="1" latinLnBrk="0" hangingPunct="1">
-              <a:lnSpc>
-                <a:spcPct val="85000"/>
-              </a:lnSpc>
-              <a:spcBef>
-                <a:spcPts val="600"/>
-              </a:spcBef>
-              <a:buFont typeface="Arial" pitchFamily="34" charset="0"/>
-              <a:buChar char=" "/>
-              <a:defRPr sz="1800" kern="1200">
-                <a:solidFill>
-                  <a:schemeClr val="tx1">
-                    <a:lumMod val="85000"/>
-                    <a:lumOff val="15000"/>
-                  </a:schemeClr>
-                </a:solidFill>
-                <a:latin typeface="+mn-lt"/>
-                <a:ea typeface="+mn-ea"/>
-                <a:cs typeface="+mn-cs"/>
-              </a:defRPr>
-            </a:lvl9pPr>
-          </a:lstStyle>
-          <a:p>
-            <a:r>
-              <a:rPr lang="sv-SE" sz="1800" dirty="0">
-                <a:solidFill>
-                  <a:schemeClr val="bg1"/>
-                </a:solidFill>
-              </a:rPr>
-              <a:t>Efterforska plugin mer noggrant, se när senaste </a:t>
-            </a:r>
-            <a:r>
-              <a:rPr lang="sv-SE" sz="1800" dirty="0" err="1">
-                <a:solidFill>
-                  <a:schemeClr val="bg1"/>
-                </a:solidFill>
-              </a:rPr>
-              <a:t>commit</a:t>
-            </a:r>
-            <a:r>
-              <a:rPr lang="sv-SE" sz="1800" dirty="0">
-                <a:solidFill>
-                  <a:schemeClr val="bg1"/>
-                </a:solidFill>
-              </a:rPr>
-              <a:t> är gjord på </a:t>
-            </a:r>
-            <a:r>
-              <a:rPr lang="sv-SE" sz="1800" dirty="0" err="1">
-                <a:solidFill>
-                  <a:schemeClr val="bg1"/>
-                </a:solidFill>
-              </a:rPr>
-              <a:t>Github</a:t>
-            </a:r>
-            <a:r>
-              <a:rPr lang="sv-SE" sz="1800" dirty="0">
-                <a:solidFill>
-                  <a:schemeClr val="bg1"/>
-                </a:solidFill>
-              </a:rPr>
-              <a:t> etc.</a:t>
-            </a:r>
-          </a:p>
-          <a:p>
-            <a:r>
-              <a:rPr lang="sv-SE" sz="1800" dirty="0">
-                <a:solidFill>
-                  <a:schemeClr val="bg1"/>
-                </a:solidFill>
-              </a:rPr>
-              <a:t>Lägga mer tid på att kartlägga applikationen för att beräkna storleken</a:t>
-            </a:r>
-          </a:p>
-          <a:p>
-            <a:pPr marL="4572" lvl="1" indent="0">
-              <a:buNone/>
-            </a:pPr>
-            <a:endParaRPr lang="sv-SE" sz="1800" dirty="0">
-              <a:solidFill>
-                <a:schemeClr val="bg1"/>
-              </a:solidFill>
-            </a:endParaRPr>
-          </a:p>
-          <a:p>
-            <a:endParaRPr lang="en-US" dirty="0"/>
-          </a:p>
-        </p:txBody>
-      </p:sp>
     </p:spTree>
     <p:extLst>
       <p:ext uri="{BB962C8B-B14F-4D97-AF65-F5344CB8AC3E}">
-        <p14:creationId xmlns:p14="http://schemas.microsoft.com/office/powerpoint/2010/main" val="3917313019"/>
+        <p14:creationId xmlns:p14="http://schemas.microsoft.com/office/powerpoint/2010/main" val="2940953659"/>
       </p:ext>
     </p:extLst>
   </p:cSld>
@@ -5482,7 +5512,7 @@
                   <a:schemeClr val="bg1"/>
                 </a:solidFill>
               </a:rPr>
-              <a:t>Nya kunskaper</a:t>
+              <a:t>Problematik</a:t>
             </a:r>
             <a:endParaRPr lang="en-US" dirty="0">
               <a:solidFill>
@@ -5504,8 +5534,8 @@
         </p:nvSpPr>
         <p:spPr>
           <a:xfrm>
-            <a:off x="492919" y="2030341"/>
-            <a:ext cx="11369935" cy="2793586"/>
+            <a:off x="492919" y="2006936"/>
+            <a:ext cx="4521809" cy="871479"/>
           </a:xfrm>
         </p:spPr>
         <p:txBody>
@@ -5515,63 +5545,33 @@
           <a:lstStyle/>
           <a:p>
             <a:r>
-              <a:rPr lang="sv-SE" sz="1800" dirty="0">
-                <a:solidFill>
-                  <a:schemeClr val="bg1"/>
-                </a:solidFill>
-              </a:rPr>
-              <a:t>Erfarenhet av grupparbete</a:t>
-            </a:r>
-          </a:p>
-          <a:p>
-            <a:r>
-              <a:rPr lang="sv-SE" sz="1800" dirty="0">
-                <a:solidFill>
-                  <a:schemeClr val="bg1"/>
-                </a:solidFill>
-              </a:rPr>
-              <a:t>Arbete mot skarp kund</a:t>
-            </a:r>
-          </a:p>
-          <a:p>
-            <a:r>
-              <a:rPr lang="sv-SE" sz="1800" dirty="0">
-                <a:solidFill>
-                  <a:schemeClr val="bg1"/>
-                </a:solidFill>
-              </a:rPr>
-              <a:t>Mer avancerad versionshantering</a:t>
-            </a:r>
-          </a:p>
-          <a:p>
-            <a:r>
-              <a:rPr lang="sv-SE" sz="1800" dirty="0">
-                <a:solidFill>
-                  <a:schemeClr val="bg1"/>
-                </a:solidFill>
-              </a:rPr>
-              <a:t>Nytt ramverk och alla småproblem som uppstår med detta.</a:t>
-            </a:r>
-          </a:p>
-          <a:p>
-            <a:r>
-              <a:rPr lang="sv-SE" sz="1800" dirty="0">
-                <a:solidFill>
-                  <a:schemeClr val="bg1"/>
-                </a:solidFill>
-              </a:rPr>
-              <a:t>Testning (både manuella och automatiska)</a:t>
-            </a:r>
-          </a:p>
-          <a:p>
-            <a:r>
-              <a:rPr lang="sv-SE" sz="1800" dirty="0">
-                <a:solidFill>
-                  <a:schemeClr val="bg1"/>
-                </a:solidFill>
-              </a:rPr>
-              <a:t>Bedöma vilken dokumentation vi har nytta av</a:t>
-            </a:r>
+              <a:rPr lang="sv-SE" sz="1800" dirty="0" err="1">
+                <a:solidFill>
+                  <a:schemeClr val="bg1"/>
+                </a:solidFill>
+              </a:rPr>
+              <a:t>Adminpanelen</a:t>
+            </a:r>
+            <a:endParaRPr lang="sv-SE" sz="1800" dirty="0">
+              <a:solidFill>
+                <a:schemeClr val="bg1"/>
+              </a:solidFill>
+            </a:endParaRPr>
+          </a:p>
+          <a:p>
+            <a:r>
+              <a:rPr lang="sv-SE" sz="1800" dirty="0" err="1">
+                <a:solidFill>
+                  <a:schemeClr val="bg1"/>
+                </a:solidFill>
+              </a:rPr>
+              <a:t>jPlayer</a:t>
+            </a:r>
+            <a:endParaRPr lang="sv-SE" sz="1800" dirty="0">
+              <a:solidFill>
+                <a:schemeClr val="bg1"/>
+              </a:solidFill>
+            </a:endParaRPr>
           </a:p>
           <a:p>
             <a:pPr marL="4572" lvl="1" indent="0">
@@ -5610,7 +5610,7 @@
         </p:blipFill>
         <p:spPr>
           <a:xfrm>
-            <a:off x="7334250" y="0"/>
+            <a:off x="7334250" y="23283"/>
             <a:ext cx="1809750" cy="952500"/>
           </a:xfrm>
           <a:prstGeom prst="rect">
@@ -5618,10 +5618,346 @@
           </a:prstGeom>
         </p:spPr>
       </p:pic>
+      <p:sp>
+        <p:nvSpPr>
+          <p:cNvPr id="5" name="Rubrik 1"/>
+          <p:cNvSpPr txBox="1">
+            <a:spLocks/>
+          </p:cNvSpPr>
+          <p:nvPr/>
+        </p:nvSpPr>
+        <p:spPr>
+          <a:xfrm>
+            <a:off x="492920" y="3076951"/>
+            <a:ext cx="6098342" cy="1658198"/>
+          </a:xfrm>
+          <a:prstGeom prst="rect">
+            <a:avLst/>
+          </a:prstGeom>
+        </p:spPr>
+        <p:txBody>
+          <a:bodyPr vert="horz" lIns="91440" tIns="45720" rIns="91440" bIns="45720" rtlCol="0" anchor="ctr">
+            <a:normAutofit/>
+          </a:bodyPr>
+          <a:lstStyle>
+            <a:lvl1pPr algn="l" defTabSz="914400" rtl="0" eaLnBrk="1" latinLnBrk="0" hangingPunct="1">
+              <a:lnSpc>
+                <a:spcPct val="85000"/>
+              </a:lnSpc>
+              <a:spcBef>
+                <a:spcPct val="0"/>
+              </a:spcBef>
+              <a:buNone/>
+              <a:defRPr sz="5400" kern="1200" spc="-120" baseline="0">
+                <a:solidFill>
+                  <a:schemeClr val="accent1"/>
+                </a:solidFill>
+                <a:latin typeface="+mj-lt"/>
+                <a:ea typeface="+mj-ea"/>
+                <a:cs typeface="+mj-cs"/>
+              </a:defRPr>
+            </a:lvl1pPr>
+          </a:lstStyle>
+          <a:p>
+            <a:r>
+              <a:rPr lang="sv-SE" dirty="0">
+                <a:solidFill>
+                  <a:schemeClr val="bg1"/>
+                </a:solidFill>
+              </a:rPr>
+              <a:t>Lärdomar</a:t>
+            </a:r>
+            <a:endParaRPr lang="en-US" dirty="0">
+              <a:solidFill>
+                <a:schemeClr val="bg1"/>
+              </a:solidFill>
+            </a:endParaRPr>
+          </a:p>
+        </p:txBody>
+      </p:sp>
+      <p:sp>
+        <p:nvSpPr>
+          <p:cNvPr id="6" name="Platshållare för innehåll 2"/>
+          <p:cNvSpPr txBox="1">
+            <a:spLocks/>
+          </p:cNvSpPr>
+          <p:nvPr/>
+        </p:nvSpPr>
+        <p:spPr>
+          <a:xfrm>
+            <a:off x="492919" y="4607760"/>
+            <a:ext cx="6436387" cy="871479"/>
+          </a:xfrm>
+          <a:prstGeom prst="rect">
+            <a:avLst/>
+          </a:prstGeom>
+        </p:spPr>
+        <p:txBody>
+          <a:bodyPr vert="horz" lIns="91440" tIns="45720" rIns="91440" bIns="45720" numCol="1" rtlCol="0">
+            <a:normAutofit fontScale="92500" lnSpcReduction="10000"/>
+          </a:bodyPr>
+          <a:lstStyle>
+            <a:lvl1pPr marL="91440" indent="-91440" algn="l" defTabSz="914400" rtl="0" eaLnBrk="1" latinLnBrk="0" hangingPunct="1">
+              <a:lnSpc>
+                <a:spcPct val="85000"/>
+              </a:lnSpc>
+              <a:spcBef>
+                <a:spcPts val="1300"/>
+              </a:spcBef>
+              <a:buFont typeface="Arial" pitchFamily="34" charset="0"/>
+              <a:buChar char=" "/>
+              <a:defRPr sz="2400" kern="1200">
+                <a:solidFill>
+                  <a:schemeClr val="tx1">
+                    <a:lumMod val="85000"/>
+                    <a:lumOff val="15000"/>
+                  </a:schemeClr>
+                </a:solidFill>
+                <a:latin typeface="+mn-lt"/>
+                <a:ea typeface="+mn-ea"/>
+                <a:cs typeface="+mn-cs"/>
+              </a:defRPr>
+            </a:lvl1pPr>
+            <a:lvl2pPr marL="347472" indent="-342900" algn="l" defTabSz="914400" rtl="0" eaLnBrk="1" latinLnBrk="0" hangingPunct="1">
+              <a:lnSpc>
+                <a:spcPct val="85000"/>
+              </a:lnSpc>
+              <a:spcBef>
+                <a:spcPts val="600"/>
+              </a:spcBef>
+              <a:buFont typeface="Arial" pitchFamily="34" charset="0"/>
+              <a:buChar char=" "/>
+              <a:defRPr sz="2400" kern="1200">
+                <a:solidFill>
+                  <a:schemeClr val="tx1">
+                    <a:lumMod val="85000"/>
+                    <a:lumOff val="15000"/>
+                  </a:schemeClr>
+                </a:solidFill>
+                <a:latin typeface="+mn-lt"/>
+                <a:ea typeface="+mn-ea"/>
+                <a:cs typeface="+mn-cs"/>
+              </a:defRPr>
+            </a:lvl2pPr>
+            <a:lvl3pPr marL="548640" indent="-548640" algn="l" defTabSz="914400" rtl="0" eaLnBrk="1" latinLnBrk="0" hangingPunct="1">
+              <a:lnSpc>
+                <a:spcPct val="85000"/>
+              </a:lnSpc>
+              <a:spcBef>
+                <a:spcPts val="600"/>
+              </a:spcBef>
+              <a:buFont typeface="Arial" pitchFamily="34" charset="0"/>
+              <a:buChar char=" "/>
+              <a:defRPr sz="2000" i="1" kern="1200">
+                <a:solidFill>
+                  <a:schemeClr val="tx1">
+                    <a:lumMod val="85000"/>
+                    <a:lumOff val="15000"/>
+                  </a:schemeClr>
+                </a:solidFill>
+                <a:latin typeface="+mn-lt"/>
+                <a:ea typeface="+mn-ea"/>
+                <a:cs typeface="+mn-cs"/>
+              </a:defRPr>
+            </a:lvl3pPr>
+            <a:lvl4pPr marL="822960" indent="-822960" algn="l" defTabSz="914400" rtl="0" eaLnBrk="1" latinLnBrk="0" hangingPunct="1">
+              <a:lnSpc>
+                <a:spcPct val="85000"/>
+              </a:lnSpc>
+              <a:spcBef>
+                <a:spcPts val="600"/>
+              </a:spcBef>
+              <a:buFont typeface="Arial" pitchFamily="34" charset="0"/>
+              <a:buChar char=" "/>
+              <a:defRPr sz="1800" kern="1200">
+                <a:solidFill>
+                  <a:schemeClr val="tx1">
+                    <a:lumMod val="85000"/>
+                    <a:lumOff val="15000"/>
+                  </a:schemeClr>
+                </a:solidFill>
+                <a:latin typeface="+mn-lt"/>
+                <a:ea typeface="+mn-ea"/>
+                <a:cs typeface="+mn-cs"/>
+              </a:defRPr>
+            </a:lvl4pPr>
+            <a:lvl5pPr marL="1097280" indent="-1097280" algn="l" defTabSz="914400" rtl="0" eaLnBrk="1" latinLnBrk="0" hangingPunct="1">
+              <a:lnSpc>
+                <a:spcPct val="85000"/>
+              </a:lnSpc>
+              <a:spcBef>
+                <a:spcPts val="600"/>
+              </a:spcBef>
+              <a:buFont typeface="Arial" pitchFamily="34" charset="0"/>
+              <a:buChar char=" "/>
+              <a:defRPr sz="1800" kern="1200">
+                <a:solidFill>
+                  <a:schemeClr val="tx1">
+                    <a:lumMod val="85000"/>
+                    <a:lumOff val="15000"/>
+                  </a:schemeClr>
+                </a:solidFill>
+                <a:latin typeface="+mn-lt"/>
+                <a:ea typeface="+mn-ea"/>
+                <a:cs typeface="+mn-cs"/>
+              </a:defRPr>
+            </a:lvl5pPr>
+            <a:lvl6pPr marL="1200000" indent="-228600" algn="l" defTabSz="914400" rtl="0" eaLnBrk="1" latinLnBrk="0" hangingPunct="1">
+              <a:lnSpc>
+                <a:spcPct val="85000"/>
+              </a:lnSpc>
+              <a:spcBef>
+                <a:spcPts val="600"/>
+              </a:spcBef>
+              <a:buFont typeface="Arial" pitchFamily="34" charset="0"/>
+              <a:buChar char=" "/>
+              <a:defRPr sz="1800" kern="1200">
+                <a:solidFill>
+                  <a:schemeClr val="tx1">
+                    <a:lumMod val="85000"/>
+                    <a:lumOff val="15000"/>
+                  </a:schemeClr>
+                </a:solidFill>
+                <a:latin typeface="+mn-lt"/>
+                <a:ea typeface="+mn-ea"/>
+                <a:cs typeface="+mn-cs"/>
+              </a:defRPr>
+            </a:lvl6pPr>
+            <a:lvl7pPr marL="1400000" indent="-228600" algn="l" defTabSz="914400" rtl="0" eaLnBrk="1" latinLnBrk="0" hangingPunct="1">
+              <a:lnSpc>
+                <a:spcPct val="85000"/>
+              </a:lnSpc>
+              <a:spcBef>
+                <a:spcPts val="600"/>
+              </a:spcBef>
+              <a:buFont typeface="Arial" pitchFamily="34" charset="0"/>
+              <a:buChar char=" "/>
+              <a:defRPr sz="1800" kern="1200">
+                <a:solidFill>
+                  <a:schemeClr val="tx1">
+                    <a:lumMod val="85000"/>
+                    <a:lumOff val="15000"/>
+                  </a:schemeClr>
+                </a:solidFill>
+                <a:latin typeface="+mn-lt"/>
+                <a:ea typeface="+mn-ea"/>
+                <a:cs typeface="+mn-cs"/>
+              </a:defRPr>
+            </a:lvl7pPr>
+            <a:lvl8pPr marL="1600000" indent="-228600" algn="l" defTabSz="914400" rtl="0" eaLnBrk="1" latinLnBrk="0" hangingPunct="1">
+              <a:lnSpc>
+                <a:spcPct val="85000"/>
+              </a:lnSpc>
+              <a:spcBef>
+                <a:spcPts val="600"/>
+              </a:spcBef>
+              <a:buFont typeface="Arial" pitchFamily="34" charset="0"/>
+              <a:buChar char=" "/>
+              <a:defRPr sz="1800" kern="1200">
+                <a:solidFill>
+                  <a:schemeClr val="tx1">
+                    <a:lumMod val="85000"/>
+                    <a:lumOff val="15000"/>
+                  </a:schemeClr>
+                </a:solidFill>
+                <a:latin typeface="+mn-lt"/>
+                <a:ea typeface="+mn-ea"/>
+                <a:cs typeface="+mn-cs"/>
+              </a:defRPr>
+            </a:lvl8pPr>
+            <a:lvl9pPr marL="1800000" indent="-228600" algn="l" defTabSz="914400" rtl="0" eaLnBrk="1" latinLnBrk="0" hangingPunct="1">
+              <a:lnSpc>
+                <a:spcPct val="85000"/>
+              </a:lnSpc>
+              <a:spcBef>
+                <a:spcPts val="600"/>
+              </a:spcBef>
+              <a:buFont typeface="Arial" pitchFamily="34" charset="0"/>
+              <a:buChar char=" "/>
+              <a:defRPr sz="1800" kern="1200">
+                <a:solidFill>
+                  <a:schemeClr val="tx1">
+                    <a:lumMod val="85000"/>
+                    <a:lumOff val="15000"/>
+                  </a:schemeClr>
+                </a:solidFill>
+                <a:latin typeface="+mn-lt"/>
+                <a:ea typeface="+mn-ea"/>
+                <a:cs typeface="+mn-cs"/>
+              </a:defRPr>
+            </a:lvl9pPr>
+          </a:lstStyle>
+          <a:p>
+            <a:r>
+              <a:rPr lang="sv-SE" sz="1800" dirty="0">
+                <a:solidFill>
+                  <a:schemeClr val="bg1"/>
+                </a:solidFill>
+              </a:rPr>
+              <a:t>Efterforska plugin mer noggrant, se när senaste </a:t>
+            </a:r>
+            <a:r>
+              <a:rPr lang="sv-SE" sz="1800" dirty="0" err="1">
+                <a:solidFill>
+                  <a:schemeClr val="bg1"/>
+                </a:solidFill>
+              </a:rPr>
+              <a:t>commit</a:t>
+            </a:r>
+            <a:r>
+              <a:rPr lang="sv-SE" sz="1800" dirty="0">
+                <a:solidFill>
+                  <a:schemeClr val="bg1"/>
+                </a:solidFill>
+              </a:rPr>
+              <a:t> är gjord på </a:t>
+            </a:r>
+            <a:r>
+              <a:rPr lang="sv-SE" sz="1800" dirty="0" err="1">
+                <a:solidFill>
+                  <a:schemeClr val="bg1"/>
+                </a:solidFill>
+              </a:rPr>
+              <a:t>Github</a:t>
+            </a:r>
+            <a:r>
+              <a:rPr lang="sv-SE" sz="1800" dirty="0">
+                <a:solidFill>
+                  <a:schemeClr val="bg1"/>
+                </a:solidFill>
+              </a:rPr>
+              <a:t> etc.</a:t>
+            </a:r>
+          </a:p>
+          <a:p>
+            <a:r>
+              <a:rPr lang="sv-SE" sz="1800" dirty="0">
+                <a:solidFill>
+                  <a:schemeClr val="bg1"/>
+                </a:solidFill>
+              </a:rPr>
+              <a:t>Lägga mer tid på att kartlägga applikationen för att beräkna storleken</a:t>
+            </a:r>
+          </a:p>
+          <a:p>
+            <a:pPr marL="4572" lvl="1" indent="0">
+              <a:buNone/>
+            </a:pPr>
+            <a:endParaRPr lang="sv-SE" sz="1800" dirty="0">
+              <a:solidFill>
+                <a:schemeClr val="bg1"/>
+              </a:solidFill>
+            </a:endParaRPr>
+          </a:p>
+          <a:p>
+            <a:endParaRPr lang="en-US" dirty="0"/>
+          </a:p>
+        </p:txBody>
+      </p:sp>
     </p:spTree>
     <p:extLst>
       <p:ext uri="{BB962C8B-B14F-4D97-AF65-F5344CB8AC3E}">
-        <p14:creationId xmlns:p14="http://schemas.microsoft.com/office/powerpoint/2010/main" val="2640005863"/>
+        <p14:creationId xmlns:p14="http://schemas.microsoft.com/office/powerpoint/2010/main" val="3917313019"/>
       </p:ext>
     </p:extLst>
   </p:cSld>

</xml_diff>